<commit_message>
code after first session + cursor move and an explosion
</commit_message>
<xml_diff>
--- a/slides.pptx
+++ b/slides.pptx
@@ -8,6 +8,7 @@
     <p:sldId id="258" r:id="rId2"/>
     <p:sldId id="256" r:id="rId3"/>
     <p:sldId id="257" r:id="rId4"/>
+    <p:sldId id="259" r:id="rId5"/>
   </p:sldIdLst>
   <p:sldSz cx="12192000" cy="6858000"/>
   <p:notesSz cx="6858000" cy="9144000"/>
@@ -3829,7 +3830,7 @@
         </p:blipFill>
         <p:spPr>
           <a:xfrm>
-            <a:off x="7582668" y="3429000"/>
+            <a:off x="7558537" y="3537596"/>
             <a:ext cx="3328335" cy="1997001"/>
           </a:xfrm>
           <a:prstGeom prst="rect">
@@ -3937,7 +3938,7 @@
         </p:blipFill>
         <p:spPr>
           <a:xfrm flipH="1">
-            <a:off x="2078477" y="3887613"/>
+            <a:off x="2078476" y="3857724"/>
             <a:ext cx="1361873" cy="1361873"/>
           </a:xfrm>
           <a:prstGeom prst="rect">
@@ -4045,7 +4046,7 @@
         </p:blipFill>
         <p:spPr>
           <a:xfrm>
-            <a:off x="9768930" y="93343"/>
+            <a:off x="9768930" y="74781"/>
             <a:ext cx="1402282" cy="3000276"/>
           </a:xfrm>
           <a:prstGeom prst="rect">
@@ -4100,13 +4101,22 @@
               </a:rPr>
             </a:br>
             <a:r>
+              <a:rPr lang="de-DE" sz="4000" dirty="0" err="1">
+                <a:solidFill>
+                  <a:schemeClr val="accent2"/>
+                </a:solidFill>
+                <a:latin typeface="Snap ITC" panose="04040A07060A02020202" pitchFamily="82" charset="0"/>
+              </a:rPr>
+              <a:t>Pythonic</a:t>
+            </a:r>
+            <a:r>
               <a:rPr lang="de-DE" sz="4000" dirty="0">
                 <a:solidFill>
                   <a:schemeClr val="accent2"/>
                 </a:solidFill>
                 <a:latin typeface="Snap ITC" panose="04040A07060A02020202" pitchFamily="82" charset="0"/>
               </a:rPr>
-              <a:t>--- TBD ---</a:t>
+              <a:t> Bubble Saga </a:t>
             </a:r>
           </a:p>
         </p:txBody>
@@ -4245,8 +4255,8 @@
         </p:nvSpPr>
         <p:spPr>
           <a:xfrm>
-            <a:off x="6712085" y="6216198"/>
-            <a:ext cx="5233481" cy="461665"/>
+            <a:off x="5240497" y="6318021"/>
+            <a:ext cx="7547042" cy="461665"/>
           </a:xfrm>
           <a:prstGeom prst="rect">
             <a:avLst/>
@@ -4271,7 +4281,7 @@
                 <a:latin typeface="Calibri" panose="020F0502020204030204" pitchFamily="34" charset="0"/>
                 <a:cs typeface="Calibri" panose="020F0502020204030204" pitchFamily="34" charset="0"/>
               </a:rPr>
-              <a:t>:  </a:t>
+              <a:t>:  https://github.com/sdiddens/PythonicBubbleSaga</a:t>
             </a:r>
           </a:p>
         </p:txBody>
@@ -4306,60 +4316,1688 @@
           <a:chExt cx="0" cy="0"/>
         </a:xfrm>
       </p:grpSpPr>
-      <p:sp>
-        <p:nvSpPr>
-          <p:cNvPr id="2" name="Titel 1">
-            <a:extLst>
-              <a:ext uri="{FF2B5EF4-FFF2-40B4-BE49-F238E27FC236}">
-                <a16:creationId xmlns:a16="http://schemas.microsoft.com/office/drawing/2014/main" id="{AEBB5CD4-97C9-ED10-1431-D476BFE313C6}"/>
-              </a:ext>
-            </a:extLst>
-          </p:cNvPr>
-          <p:cNvSpPr>
-            <a:spLocks noGrp="1"/>
-          </p:cNvSpPr>
-          <p:nvPr>
-            <p:ph type="ctrTitle"/>
-          </p:nvPr>
-        </p:nvSpPr>
-        <p:spPr/>
-        <p:txBody>
-          <a:bodyPr/>
-          <a:lstStyle/>
-          <a:p>
-            <a:endParaRPr lang="de-DE" dirty="0"/>
-          </a:p>
-        </p:txBody>
-      </p:sp>
-      <p:sp>
-        <p:nvSpPr>
-          <p:cNvPr id="3" name="Untertitel 2">
-            <a:extLst>
-              <a:ext uri="{FF2B5EF4-FFF2-40B4-BE49-F238E27FC236}">
-                <a16:creationId xmlns:a16="http://schemas.microsoft.com/office/drawing/2014/main" id="{4E97BE53-789D-540B-D4E2-C3BFF8C54544}"/>
-              </a:ext>
-            </a:extLst>
-          </p:cNvPr>
-          <p:cNvSpPr>
-            <a:spLocks noGrp="1"/>
-          </p:cNvSpPr>
-          <p:nvPr>
-            <p:ph type="subTitle" idx="1"/>
-          </p:nvPr>
-        </p:nvSpPr>
-        <p:spPr/>
-        <p:txBody>
-          <a:bodyPr/>
-          <a:lstStyle/>
-          <a:p>
-            <a:endParaRPr lang="de-DE"/>
-          </a:p>
-        </p:txBody>
-      </p:sp>
+      <p:pic>
+        <p:nvPicPr>
+          <p:cNvPr id="4" name="Grafik 3">
+            <a:extLst>
+              <a:ext uri="{FF2B5EF4-FFF2-40B4-BE49-F238E27FC236}">
+                <a16:creationId xmlns:a16="http://schemas.microsoft.com/office/drawing/2014/main" id="{6FCD830C-8902-48E7-D84D-1313B7941857}"/>
+              </a:ext>
+            </a:extLst>
+          </p:cNvPr>
+          <p:cNvPicPr>
+            <a:picLocks noChangeAspect="1"/>
+          </p:cNvPicPr>
+          <p:nvPr/>
+        </p:nvPicPr>
+        <p:blipFill>
+          <a:blip r:embed="rId2">
+            <a:extLst>
+              <a:ext uri="{28A0092B-C50C-407E-A947-70E740481C1C}">
+                <a14:useLocalDpi xmlns:a14="http://schemas.microsoft.com/office/drawing/2010/main" val="0"/>
+              </a:ext>
+            </a:extLst>
+          </a:blip>
+          <a:stretch>
+            <a:fillRect/>
+          </a:stretch>
+        </p:blipFill>
+        <p:spPr>
+          <a:xfrm>
+            <a:off x="0" y="0"/>
+            <a:ext cx="11430000" cy="6858000"/>
+          </a:xfrm>
+          <a:prstGeom prst="rect">
+            <a:avLst/>
+          </a:prstGeom>
+        </p:spPr>
+      </p:pic>
+      <p:pic>
+        <p:nvPicPr>
+          <p:cNvPr id="5" name="Grafik 4" descr="Ein Bild, das Clipart, Zeichnung, Cartoon, Kunst enthält.&#10;&#10;Automatisch generierte Beschreibung">
+            <a:extLst>
+              <a:ext uri="{FF2B5EF4-FFF2-40B4-BE49-F238E27FC236}">
+                <a16:creationId xmlns:a16="http://schemas.microsoft.com/office/drawing/2014/main" id="{A753BE82-7573-DE61-9EA6-E035B6553E76}"/>
+              </a:ext>
+            </a:extLst>
+          </p:cNvPr>
+          <p:cNvPicPr>
+            <a:picLocks noChangeAspect="1"/>
+          </p:cNvPicPr>
+          <p:nvPr/>
+        </p:nvPicPr>
+        <p:blipFill>
+          <a:blip r:embed="rId3">
+            <a:extLst>
+              <a:ext uri="{28A0092B-C50C-407E-A947-70E740481C1C}">
+                <a14:useLocalDpi xmlns:a14="http://schemas.microsoft.com/office/drawing/2010/main" val="0"/>
+              </a:ext>
+            </a:extLst>
+          </a:blip>
+          <a:stretch>
+            <a:fillRect/>
+          </a:stretch>
+        </p:blipFill>
+        <p:spPr>
+          <a:xfrm>
+            <a:off x="902689" y="3704513"/>
+            <a:ext cx="1402282" cy="3000276"/>
+          </a:xfrm>
+          <a:prstGeom prst="rect">
+            <a:avLst/>
+          </a:prstGeom>
+        </p:spPr>
+      </p:pic>
+      <p:pic>
+        <p:nvPicPr>
+          <p:cNvPr id="6" name="Grafik 5" descr="Ein Bild, das Kreis, Kugel, Planet, Astronomisches Objekt enthält.&#10;&#10;Automatisch generierte Beschreibung">
+            <a:extLst>
+              <a:ext uri="{FF2B5EF4-FFF2-40B4-BE49-F238E27FC236}">
+                <a16:creationId xmlns:a16="http://schemas.microsoft.com/office/drawing/2014/main" id="{722268D5-A078-173B-A2B7-B9E0E8682F60}"/>
+              </a:ext>
+            </a:extLst>
+          </p:cNvPr>
+          <p:cNvPicPr>
+            <a:picLocks noChangeAspect="1"/>
+          </p:cNvPicPr>
+          <p:nvPr/>
+        </p:nvPicPr>
+        <p:blipFill>
+          <a:blip r:embed="rId4">
+            <a:extLst>
+              <a:ext uri="{28A0092B-C50C-407E-A947-70E740481C1C}">
+                <a14:useLocalDpi xmlns:a14="http://schemas.microsoft.com/office/drawing/2010/main" val="0"/>
+              </a:ext>
+            </a:extLst>
+          </a:blip>
+          <a:stretch>
+            <a:fillRect/>
+          </a:stretch>
+        </p:blipFill>
+        <p:spPr>
+          <a:xfrm flipH="1">
+            <a:off x="241958" y="1691595"/>
+            <a:ext cx="1361872" cy="1361872"/>
+          </a:xfrm>
+          <a:prstGeom prst="rect">
+            <a:avLst/>
+          </a:prstGeom>
+        </p:spPr>
+      </p:pic>
+      <p:pic>
+        <p:nvPicPr>
+          <p:cNvPr id="7" name="Grafik 6" descr="Ein Bild, das Kreis, Geschirr, Grün, Schüssel enthält.&#10;&#10;Automatisch generierte Beschreibung">
+            <a:extLst>
+              <a:ext uri="{FF2B5EF4-FFF2-40B4-BE49-F238E27FC236}">
+                <a16:creationId xmlns:a16="http://schemas.microsoft.com/office/drawing/2014/main" id="{C714CFD8-0AEB-7F9D-B944-B4F97E8FDCF1}"/>
+              </a:ext>
+            </a:extLst>
+          </p:cNvPr>
+          <p:cNvPicPr>
+            <a:picLocks noChangeAspect="1"/>
+          </p:cNvPicPr>
+          <p:nvPr/>
+        </p:nvPicPr>
+        <p:blipFill>
+          <a:blip r:embed="rId5">
+            <a:extLst>
+              <a:ext uri="{28A0092B-C50C-407E-A947-70E740481C1C}">
+                <a14:useLocalDpi xmlns:a14="http://schemas.microsoft.com/office/drawing/2010/main" val="0"/>
+              </a:ext>
+            </a:extLst>
+          </a:blip>
+          <a:stretch>
+            <a:fillRect/>
+          </a:stretch>
+        </p:blipFill>
+        <p:spPr>
+          <a:xfrm>
+            <a:off x="1788656" y="1691595"/>
+            <a:ext cx="1361872" cy="1361872"/>
+          </a:xfrm>
+          <a:prstGeom prst="rect">
+            <a:avLst/>
+          </a:prstGeom>
+        </p:spPr>
+      </p:pic>
+      <p:pic>
+        <p:nvPicPr>
+          <p:cNvPr id="8" name="Grafik 7" descr="Ein Bild, das Kreis, Farbigkeit, Geschirr enthält.&#10;&#10;Automatisch generierte Beschreibung">
+            <a:extLst>
+              <a:ext uri="{FF2B5EF4-FFF2-40B4-BE49-F238E27FC236}">
+                <a16:creationId xmlns:a16="http://schemas.microsoft.com/office/drawing/2014/main" id="{AE0C288F-828D-1F2E-22A1-2224E32903FA}"/>
+              </a:ext>
+            </a:extLst>
+          </p:cNvPr>
+          <p:cNvPicPr>
+            <a:picLocks noChangeAspect="1"/>
+          </p:cNvPicPr>
+          <p:nvPr/>
+        </p:nvPicPr>
+        <p:blipFill>
+          <a:blip r:embed="rId6">
+            <a:extLst>
+              <a:ext uri="{28A0092B-C50C-407E-A947-70E740481C1C}">
+                <a14:useLocalDpi xmlns:a14="http://schemas.microsoft.com/office/drawing/2010/main" val="0"/>
+              </a:ext>
+            </a:extLst>
+          </a:blip>
+          <a:stretch>
+            <a:fillRect/>
+          </a:stretch>
+        </p:blipFill>
+        <p:spPr>
+          <a:xfrm flipH="1">
+            <a:off x="1015306" y="359612"/>
+            <a:ext cx="1361873" cy="1361873"/>
+          </a:xfrm>
+          <a:prstGeom prst="rect">
+            <a:avLst/>
+          </a:prstGeom>
+        </p:spPr>
+      </p:pic>
+      <p:pic>
+        <p:nvPicPr>
+          <p:cNvPr id="9" name="Grafik 8" descr="Ein Bild, das Kreis enthält.&#10;&#10;Automatisch generierte Beschreibung">
+            <a:extLst>
+              <a:ext uri="{FF2B5EF4-FFF2-40B4-BE49-F238E27FC236}">
+                <a16:creationId xmlns:a16="http://schemas.microsoft.com/office/drawing/2014/main" id="{7D440A9C-63F0-8417-FD76-847533E1CC62}"/>
+              </a:ext>
+            </a:extLst>
+          </p:cNvPr>
+          <p:cNvPicPr>
+            <a:picLocks noChangeAspect="1"/>
+          </p:cNvPicPr>
+          <p:nvPr/>
+        </p:nvPicPr>
+        <p:blipFill>
+          <a:blip r:embed="rId7">
+            <a:extLst>
+              <a:ext uri="{28A0092B-C50C-407E-A947-70E740481C1C}">
+                <a14:useLocalDpi xmlns:a14="http://schemas.microsoft.com/office/drawing/2010/main" val="0"/>
+              </a:ext>
+            </a:extLst>
+          </a:blip>
+          <a:stretch>
+            <a:fillRect/>
+          </a:stretch>
+        </p:blipFill>
+        <p:spPr>
+          <a:xfrm>
+            <a:off x="2562005" y="359612"/>
+            <a:ext cx="1361872" cy="1361872"/>
+          </a:xfrm>
+          <a:prstGeom prst="rect">
+            <a:avLst/>
+          </a:prstGeom>
+        </p:spPr>
+      </p:pic>
+      <p:pic>
+        <p:nvPicPr>
+          <p:cNvPr id="10" name="Grafik 9" descr="Ein Bild, das Kreis, Farbigkeit, Geschirr enthält.&#10;&#10;Automatisch generierte Beschreibung">
+            <a:extLst>
+              <a:ext uri="{FF2B5EF4-FFF2-40B4-BE49-F238E27FC236}">
+                <a16:creationId xmlns:a16="http://schemas.microsoft.com/office/drawing/2014/main" id="{68363198-7DBE-A1B9-21F5-E1000201B91D}"/>
+              </a:ext>
+            </a:extLst>
+          </p:cNvPr>
+          <p:cNvPicPr>
+            <a:picLocks noChangeAspect="1"/>
+          </p:cNvPicPr>
+          <p:nvPr/>
+        </p:nvPicPr>
+        <p:blipFill>
+          <a:blip r:embed="rId8">
+            <a:extLst>
+              <a:ext uri="{28A0092B-C50C-407E-A947-70E740481C1C}">
+                <a14:useLocalDpi xmlns:a14="http://schemas.microsoft.com/office/drawing/2010/main" val="0"/>
+              </a:ext>
+            </a:extLst>
+          </a:blip>
+          <a:stretch>
+            <a:fillRect/>
+          </a:stretch>
+        </p:blipFill>
+        <p:spPr>
+          <a:xfrm>
+            <a:off x="3335354" y="1691595"/>
+            <a:ext cx="1361872" cy="1361872"/>
+          </a:xfrm>
+          <a:prstGeom prst="rect">
+            <a:avLst/>
+          </a:prstGeom>
+        </p:spPr>
+      </p:pic>
+      <p:pic>
+        <p:nvPicPr>
+          <p:cNvPr id="16" name="Grafik 15" descr="Ein Bild, das Kreis, Farbigkeit, Geschirr enthält.&#10;&#10;Automatisch generierte Beschreibung">
+            <a:extLst>
+              <a:ext uri="{FF2B5EF4-FFF2-40B4-BE49-F238E27FC236}">
+                <a16:creationId xmlns:a16="http://schemas.microsoft.com/office/drawing/2014/main" id="{8D7C0970-A4C1-FF7C-11C1-2568DC8439AA}"/>
+              </a:ext>
+            </a:extLst>
+          </p:cNvPr>
+          <p:cNvPicPr>
+            <a:picLocks noChangeAspect="1"/>
+          </p:cNvPicPr>
+          <p:nvPr/>
+        </p:nvPicPr>
+        <p:blipFill>
+          <a:blip r:embed="rId8">
+            <a:extLst>
+              <a:ext uri="{28A0092B-C50C-407E-A947-70E740481C1C}">
+                <a14:useLocalDpi xmlns:a14="http://schemas.microsoft.com/office/drawing/2010/main" val="0"/>
+              </a:ext>
+            </a:extLst>
+          </a:blip>
+          <a:stretch>
+            <a:fillRect/>
+          </a:stretch>
+        </p:blipFill>
+        <p:spPr>
+          <a:xfrm>
+            <a:off x="975163" y="5342917"/>
+            <a:ext cx="1361872" cy="1361872"/>
+          </a:xfrm>
+          <a:prstGeom prst="rect">
+            <a:avLst/>
+          </a:prstGeom>
+        </p:spPr>
+      </p:pic>
+      <p:pic>
+        <p:nvPicPr>
+          <p:cNvPr id="17" name="Grafik 16" descr="Ein Bild, das Clipart, Zeichnung, Cartoon, Kunst enthält.&#10;&#10;Automatisch generierte Beschreibung">
+            <a:extLst>
+              <a:ext uri="{FF2B5EF4-FFF2-40B4-BE49-F238E27FC236}">
+                <a16:creationId xmlns:a16="http://schemas.microsoft.com/office/drawing/2014/main" id="{48CC2B55-C6B7-19A0-AB23-BA0204697F2A}"/>
+              </a:ext>
+            </a:extLst>
+          </p:cNvPr>
+          <p:cNvPicPr>
+            <a:picLocks noChangeAspect="1"/>
+          </p:cNvPicPr>
+          <p:nvPr/>
+        </p:nvPicPr>
+        <p:blipFill>
+          <a:blip r:embed="rId3">
+            <a:extLst>
+              <a:ext uri="{28A0092B-C50C-407E-A947-70E740481C1C}">
+                <a14:useLocalDpi xmlns:a14="http://schemas.microsoft.com/office/drawing/2010/main" val="0"/>
+              </a:ext>
+            </a:extLst>
+          </a:blip>
+          <a:stretch>
+            <a:fillRect/>
+          </a:stretch>
+        </p:blipFill>
+        <p:spPr>
+          <a:xfrm>
+            <a:off x="7881857" y="3704513"/>
+            <a:ext cx="1402282" cy="3000276"/>
+          </a:xfrm>
+          <a:prstGeom prst="rect">
+            <a:avLst/>
+          </a:prstGeom>
+        </p:spPr>
+      </p:pic>
+      <p:pic>
+        <p:nvPicPr>
+          <p:cNvPr id="18" name="Grafik 17" descr="Ein Bild, das Kreis, Kugel, Planet, Astronomisches Objekt enthält.&#10;&#10;Automatisch generierte Beschreibung">
+            <a:extLst>
+              <a:ext uri="{FF2B5EF4-FFF2-40B4-BE49-F238E27FC236}">
+                <a16:creationId xmlns:a16="http://schemas.microsoft.com/office/drawing/2014/main" id="{539819E2-E422-8445-7BDE-FF3D4DE1C831}"/>
+              </a:ext>
+            </a:extLst>
+          </p:cNvPr>
+          <p:cNvPicPr>
+            <a:picLocks noChangeAspect="1"/>
+          </p:cNvPicPr>
+          <p:nvPr/>
+        </p:nvPicPr>
+        <p:blipFill>
+          <a:blip r:embed="rId4">
+            <a:extLst>
+              <a:ext uri="{28A0092B-C50C-407E-A947-70E740481C1C}">
+                <a14:useLocalDpi xmlns:a14="http://schemas.microsoft.com/office/drawing/2010/main" val="0"/>
+              </a:ext>
+            </a:extLst>
+          </a:blip>
+          <a:stretch>
+            <a:fillRect/>
+          </a:stretch>
+        </p:blipFill>
+        <p:spPr>
+          <a:xfrm flipH="1">
+            <a:off x="6365950" y="1691595"/>
+            <a:ext cx="1361872" cy="1361872"/>
+          </a:xfrm>
+          <a:prstGeom prst="rect">
+            <a:avLst/>
+          </a:prstGeom>
+        </p:spPr>
+      </p:pic>
+      <p:pic>
+        <p:nvPicPr>
+          <p:cNvPr id="19" name="Grafik 18" descr="Ein Bild, das Kreis, Geschirr, Grün, Schüssel enthält.&#10;&#10;Automatisch generierte Beschreibung">
+            <a:extLst>
+              <a:ext uri="{FF2B5EF4-FFF2-40B4-BE49-F238E27FC236}">
+                <a16:creationId xmlns:a16="http://schemas.microsoft.com/office/drawing/2014/main" id="{6A24C32E-BD3B-7EE3-471A-A403A950036D}"/>
+              </a:ext>
+            </a:extLst>
+          </p:cNvPr>
+          <p:cNvPicPr>
+            <a:picLocks noChangeAspect="1"/>
+          </p:cNvPicPr>
+          <p:nvPr/>
+        </p:nvPicPr>
+        <p:blipFill>
+          <a:blip r:embed="rId5">
+            <a:extLst>
+              <a:ext uri="{28A0092B-C50C-407E-A947-70E740481C1C}">
+                <a14:useLocalDpi xmlns:a14="http://schemas.microsoft.com/office/drawing/2010/main" val="0"/>
+              </a:ext>
+            </a:extLst>
+          </a:blip>
+          <a:stretch>
+            <a:fillRect/>
+          </a:stretch>
+        </p:blipFill>
+        <p:spPr>
+          <a:xfrm>
+            <a:off x="7912648" y="1691595"/>
+            <a:ext cx="1361872" cy="1361872"/>
+          </a:xfrm>
+          <a:prstGeom prst="rect">
+            <a:avLst/>
+          </a:prstGeom>
+        </p:spPr>
+      </p:pic>
+      <p:pic>
+        <p:nvPicPr>
+          <p:cNvPr id="20" name="Grafik 19" descr="Ein Bild, das Kreis, Farbigkeit, Geschirr enthält.&#10;&#10;Automatisch generierte Beschreibung">
+            <a:extLst>
+              <a:ext uri="{FF2B5EF4-FFF2-40B4-BE49-F238E27FC236}">
+                <a16:creationId xmlns:a16="http://schemas.microsoft.com/office/drawing/2014/main" id="{77CF6DCF-181A-6C35-A76C-A58625E2A1FB}"/>
+              </a:ext>
+            </a:extLst>
+          </p:cNvPr>
+          <p:cNvPicPr>
+            <a:picLocks noChangeAspect="1"/>
+          </p:cNvPicPr>
+          <p:nvPr/>
+        </p:nvPicPr>
+        <p:blipFill>
+          <a:blip r:embed="rId6">
+            <a:extLst>
+              <a:ext uri="{28A0092B-C50C-407E-A947-70E740481C1C}">
+                <a14:useLocalDpi xmlns:a14="http://schemas.microsoft.com/office/drawing/2010/main" val="0"/>
+              </a:ext>
+            </a:extLst>
+          </a:blip>
+          <a:stretch>
+            <a:fillRect/>
+          </a:stretch>
+        </p:blipFill>
+        <p:spPr>
+          <a:xfrm flipH="1">
+            <a:off x="6365949" y="191457"/>
+            <a:ext cx="1361873" cy="1361873"/>
+          </a:xfrm>
+          <a:prstGeom prst="rect">
+            <a:avLst/>
+          </a:prstGeom>
+        </p:spPr>
+      </p:pic>
+      <p:pic>
+        <p:nvPicPr>
+          <p:cNvPr id="21" name="Grafik 20" descr="Ein Bild, das Kreis enthält.&#10;&#10;Automatisch generierte Beschreibung">
+            <a:extLst>
+              <a:ext uri="{FF2B5EF4-FFF2-40B4-BE49-F238E27FC236}">
+                <a16:creationId xmlns:a16="http://schemas.microsoft.com/office/drawing/2014/main" id="{493E7775-1441-2E78-96FD-1B78A4D0DEA1}"/>
+              </a:ext>
+            </a:extLst>
+          </p:cNvPr>
+          <p:cNvPicPr>
+            <a:picLocks noChangeAspect="1"/>
+          </p:cNvPicPr>
+          <p:nvPr/>
+        </p:nvPicPr>
+        <p:blipFill>
+          <a:blip r:embed="rId7">
+            <a:extLst>
+              <a:ext uri="{28A0092B-C50C-407E-A947-70E740481C1C}">
+                <a14:useLocalDpi xmlns:a14="http://schemas.microsoft.com/office/drawing/2010/main" val="0"/>
+              </a:ext>
+            </a:extLst>
+          </a:blip>
+          <a:stretch>
+            <a:fillRect/>
+          </a:stretch>
+        </p:blipFill>
+        <p:spPr>
+          <a:xfrm>
+            <a:off x="7922598" y="191458"/>
+            <a:ext cx="1361872" cy="1361872"/>
+          </a:xfrm>
+          <a:prstGeom prst="rect">
+            <a:avLst/>
+          </a:prstGeom>
+        </p:spPr>
+      </p:pic>
+      <p:pic>
+        <p:nvPicPr>
+          <p:cNvPr id="22" name="Grafik 21" descr="Ein Bild, das Kreis, Farbigkeit, Geschirr enthält.&#10;&#10;Automatisch generierte Beschreibung">
+            <a:extLst>
+              <a:ext uri="{FF2B5EF4-FFF2-40B4-BE49-F238E27FC236}">
+                <a16:creationId xmlns:a16="http://schemas.microsoft.com/office/drawing/2014/main" id="{3B1A3ED4-5B23-C24A-21B8-D79318905677}"/>
+              </a:ext>
+            </a:extLst>
+          </p:cNvPr>
+          <p:cNvPicPr>
+            <a:picLocks noChangeAspect="1"/>
+          </p:cNvPicPr>
+          <p:nvPr/>
+        </p:nvPicPr>
+        <p:blipFill>
+          <a:blip r:embed="rId8">
+            <a:extLst>
+              <a:ext uri="{28A0092B-C50C-407E-A947-70E740481C1C}">
+                <a14:useLocalDpi xmlns:a14="http://schemas.microsoft.com/office/drawing/2010/main" val="0"/>
+              </a:ext>
+            </a:extLst>
+          </a:blip>
+          <a:stretch>
+            <a:fillRect/>
+          </a:stretch>
+        </p:blipFill>
+        <p:spPr>
+          <a:xfrm>
+            <a:off x="9459346" y="1691595"/>
+            <a:ext cx="1361872" cy="1361872"/>
+          </a:xfrm>
+          <a:prstGeom prst="rect">
+            <a:avLst/>
+          </a:prstGeom>
+        </p:spPr>
+      </p:pic>
+      <p:pic>
+        <p:nvPicPr>
+          <p:cNvPr id="23" name="Grafik 22" descr="Ein Bild, das Kreis, Farbigkeit, Geschirr enthält.&#10;&#10;Automatisch generierte Beschreibung">
+            <a:extLst>
+              <a:ext uri="{FF2B5EF4-FFF2-40B4-BE49-F238E27FC236}">
+                <a16:creationId xmlns:a16="http://schemas.microsoft.com/office/drawing/2014/main" id="{81635417-579B-4A70-07F1-C5D9F5B4D99B}"/>
+              </a:ext>
+            </a:extLst>
+          </p:cNvPr>
+          <p:cNvPicPr>
+            <a:picLocks noChangeAspect="1"/>
+          </p:cNvPicPr>
+          <p:nvPr/>
+        </p:nvPicPr>
+        <p:blipFill>
+          <a:blip r:embed="rId8">
+            <a:extLst>
+              <a:ext uri="{28A0092B-C50C-407E-A947-70E740481C1C}">
+                <a14:useLocalDpi xmlns:a14="http://schemas.microsoft.com/office/drawing/2010/main" val="0"/>
+              </a:ext>
+            </a:extLst>
+          </a:blip>
+          <a:stretch>
+            <a:fillRect/>
+          </a:stretch>
+        </p:blipFill>
+        <p:spPr>
+          <a:xfrm>
+            <a:off x="7902062" y="5342917"/>
+            <a:ext cx="1361872" cy="1361872"/>
+          </a:xfrm>
+          <a:prstGeom prst="rect">
+            <a:avLst/>
+          </a:prstGeom>
+        </p:spPr>
+      </p:pic>
     </p:spTree>
     <p:extLst>
       <p:ext uri="{BB962C8B-B14F-4D97-AF65-F5344CB8AC3E}">
         <p14:creationId xmlns:p14="http://schemas.microsoft.com/office/powerpoint/2010/main" val="922418835"/>
+      </p:ext>
+    </p:extLst>
+  </p:cSld>
+  <p:clrMapOvr>
+    <a:masterClrMapping/>
+  </p:clrMapOvr>
+</p:sld>
+</file>
+
+<file path=ppt/slides/slide4.xml><?xml version="1.0" encoding="utf-8"?>
+<p:sld xmlns:a="http://schemas.openxmlformats.org/drawingml/2006/main" xmlns:r="http://schemas.openxmlformats.org/officeDocument/2006/relationships" xmlns:p="http://schemas.openxmlformats.org/presentationml/2006/main">
+  <p:cSld>
+    <p:spTree>
+      <p:nvGrpSpPr>
+        <p:cNvPr id="1" name=""/>
+        <p:cNvGrpSpPr/>
+        <p:nvPr/>
+      </p:nvGrpSpPr>
+      <p:grpSpPr>
+        <a:xfrm>
+          <a:off x="0" y="0"/>
+          <a:ext cx="0" cy="0"/>
+          <a:chOff x="0" y="0"/>
+          <a:chExt cx="0" cy="0"/>
+        </a:xfrm>
+      </p:grpSpPr>
+      <p:cxnSp>
+        <p:nvCxnSpPr>
+          <p:cNvPr id="5" name="Gerader Verbinder 4">
+            <a:extLst>
+              <a:ext uri="{FF2B5EF4-FFF2-40B4-BE49-F238E27FC236}">
+                <a16:creationId xmlns:a16="http://schemas.microsoft.com/office/drawing/2014/main" id="{1542534B-A471-B07C-01F3-9FAE5F77C831}"/>
+              </a:ext>
+            </a:extLst>
+          </p:cNvPr>
+          <p:cNvCxnSpPr/>
+          <p:nvPr/>
+        </p:nvCxnSpPr>
+        <p:spPr>
+          <a:xfrm>
+            <a:off x="99588" y="932507"/>
+            <a:ext cx="12004895" cy="0"/>
+          </a:xfrm>
+          <a:prstGeom prst="line">
+            <a:avLst/>
+          </a:prstGeom>
+        </p:spPr>
+        <p:style>
+          <a:lnRef idx="2">
+            <a:schemeClr val="accent1"/>
+          </a:lnRef>
+          <a:fillRef idx="0">
+            <a:schemeClr val="accent1"/>
+          </a:fillRef>
+          <a:effectRef idx="1">
+            <a:schemeClr val="accent1"/>
+          </a:effectRef>
+          <a:fontRef idx="minor">
+            <a:schemeClr val="tx1"/>
+          </a:fontRef>
+        </p:style>
+      </p:cxnSp>
+      <p:cxnSp>
+        <p:nvCxnSpPr>
+          <p:cNvPr id="7" name="Gerader Verbinder 6">
+            <a:extLst>
+              <a:ext uri="{FF2B5EF4-FFF2-40B4-BE49-F238E27FC236}">
+                <a16:creationId xmlns:a16="http://schemas.microsoft.com/office/drawing/2014/main" id="{4E3BB6FA-8637-CE6C-6BC7-2A97912C188D}"/>
+              </a:ext>
+            </a:extLst>
+          </p:cNvPr>
+          <p:cNvCxnSpPr/>
+          <p:nvPr/>
+        </p:nvCxnSpPr>
+        <p:spPr>
+          <a:xfrm>
+            <a:off x="99588" y="1683945"/>
+            <a:ext cx="11887200" cy="0"/>
+          </a:xfrm>
+          <a:prstGeom prst="line">
+            <a:avLst/>
+          </a:prstGeom>
+        </p:spPr>
+        <p:style>
+          <a:lnRef idx="2">
+            <a:schemeClr val="accent1"/>
+          </a:lnRef>
+          <a:fillRef idx="0">
+            <a:schemeClr val="accent1"/>
+          </a:fillRef>
+          <a:effectRef idx="1">
+            <a:schemeClr val="accent1"/>
+          </a:effectRef>
+          <a:fontRef idx="minor">
+            <a:schemeClr val="tx1"/>
+          </a:fontRef>
+        </p:style>
+      </p:cxnSp>
+      <p:cxnSp>
+        <p:nvCxnSpPr>
+          <p:cNvPr id="8" name="Gerader Verbinder 7">
+            <a:extLst>
+              <a:ext uri="{FF2B5EF4-FFF2-40B4-BE49-F238E27FC236}">
+                <a16:creationId xmlns:a16="http://schemas.microsoft.com/office/drawing/2014/main" id="{08A8AA38-FD8F-1566-7402-A3CCD61B19FC}"/>
+              </a:ext>
+            </a:extLst>
+          </p:cNvPr>
+          <p:cNvCxnSpPr/>
+          <p:nvPr/>
+        </p:nvCxnSpPr>
+        <p:spPr>
+          <a:xfrm>
+            <a:off x="99588" y="2623997"/>
+            <a:ext cx="11887200" cy="0"/>
+          </a:xfrm>
+          <a:prstGeom prst="line">
+            <a:avLst/>
+          </a:prstGeom>
+        </p:spPr>
+        <p:style>
+          <a:lnRef idx="2">
+            <a:schemeClr val="accent1"/>
+          </a:lnRef>
+          <a:fillRef idx="0">
+            <a:schemeClr val="accent1"/>
+          </a:fillRef>
+          <a:effectRef idx="1">
+            <a:schemeClr val="accent1"/>
+          </a:effectRef>
+          <a:fontRef idx="minor">
+            <a:schemeClr val="tx1"/>
+          </a:fontRef>
+        </p:style>
+      </p:cxnSp>
+      <p:cxnSp>
+        <p:nvCxnSpPr>
+          <p:cNvPr id="9" name="Gerader Verbinder 8">
+            <a:extLst>
+              <a:ext uri="{FF2B5EF4-FFF2-40B4-BE49-F238E27FC236}">
+                <a16:creationId xmlns:a16="http://schemas.microsoft.com/office/drawing/2014/main" id="{3D11C230-0128-E832-CCEB-02050B4F44AB}"/>
+              </a:ext>
+            </a:extLst>
+          </p:cNvPr>
+          <p:cNvCxnSpPr/>
+          <p:nvPr/>
+        </p:nvCxnSpPr>
+        <p:spPr>
+          <a:xfrm>
+            <a:off x="152400" y="3583664"/>
+            <a:ext cx="11887200" cy="0"/>
+          </a:xfrm>
+          <a:prstGeom prst="line">
+            <a:avLst/>
+          </a:prstGeom>
+        </p:spPr>
+        <p:style>
+          <a:lnRef idx="2">
+            <a:schemeClr val="accent1"/>
+          </a:lnRef>
+          <a:fillRef idx="0">
+            <a:schemeClr val="accent1"/>
+          </a:fillRef>
+          <a:effectRef idx="1">
+            <a:schemeClr val="accent1"/>
+          </a:effectRef>
+          <a:fontRef idx="minor">
+            <a:schemeClr val="tx1"/>
+          </a:fontRef>
+        </p:style>
+      </p:cxnSp>
+      <p:cxnSp>
+        <p:nvCxnSpPr>
+          <p:cNvPr id="11" name="Gerader Verbinder 10">
+            <a:extLst>
+              <a:ext uri="{FF2B5EF4-FFF2-40B4-BE49-F238E27FC236}">
+                <a16:creationId xmlns:a16="http://schemas.microsoft.com/office/drawing/2014/main" id="{A12A7ADA-1DC7-53D0-B6E6-6D75C1E374D4}"/>
+              </a:ext>
+            </a:extLst>
+          </p:cNvPr>
+          <p:cNvCxnSpPr/>
+          <p:nvPr/>
+        </p:nvCxnSpPr>
+        <p:spPr>
+          <a:xfrm>
+            <a:off x="860079" y="0"/>
+            <a:ext cx="0" cy="4553893"/>
+          </a:xfrm>
+          <a:prstGeom prst="line">
+            <a:avLst/>
+          </a:prstGeom>
+        </p:spPr>
+        <p:style>
+          <a:lnRef idx="2">
+            <a:schemeClr val="accent1"/>
+          </a:lnRef>
+          <a:fillRef idx="0">
+            <a:schemeClr val="accent1"/>
+          </a:fillRef>
+          <a:effectRef idx="1">
+            <a:schemeClr val="accent1"/>
+          </a:effectRef>
+          <a:fontRef idx="minor">
+            <a:schemeClr val="tx1"/>
+          </a:fontRef>
+        </p:style>
+      </p:cxnSp>
+      <p:cxnSp>
+        <p:nvCxnSpPr>
+          <p:cNvPr id="12" name="Gerader Verbinder 11">
+            <a:extLst>
+              <a:ext uri="{FF2B5EF4-FFF2-40B4-BE49-F238E27FC236}">
+                <a16:creationId xmlns:a16="http://schemas.microsoft.com/office/drawing/2014/main" id="{5DEBCF73-34FA-BEC0-0DD8-2ACECDB42C0B}"/>
+              </a:ext>
+            </a:extLst>
+          </p:cNvPr>
+          <p:cNvCxnSpPr/>
+          <p:nvPr/>
+        </p:nvCxnSpPr>
+        <p:spPr>
+          <a:xfrm>
+            <a:off x="2153215" y="0"/>
+            <a:ext cx="0" cy="4553893"/>
+          </a:xfrm>
+          <a:prstGeom prst="line">
+            <a:avLst/>
+          </a:prstGeom>
+        </p:spPr>
+        <p:style>
+          <a:lnRef idx="2">
+            <a:schemeClr val="accent1"/>
+          </a:lnRef>
+          <a:fillRef idx="0">
+            <a:schemeClr val="accent1"/>
+          </a:fillRef>
+          <a:effectRef idx="1">
+            <a:schemeClr val="accent1"/>
+          </a:effectRef>
+          <a:fontRef idx="minor">
+            <a:schemeClr val="tx1"/>
+          </a:fontRef>
+        </p:style>
+      </p:cxnSp>
+      <p:cxnSp>
+        <p:nvCxnSpPr>
+          <p:cNvPr id="13" name="Gerader Verbinder 12">
+            <a:extLst>
+              <a:ext uri="{FF2B5EF4-FFF2-40B4-BE49-F238E27FC236}">
+                <a16:creationId xmlns:a16="http://schemas.microsoft.com/office/drawing/2014/main" id="{09E1FCB9-308A-EA39-8824-3C8D26E915C0}"/>
+              </a:ext>
+            </a:extLst>
+          </p:cNvPr>
+          <p:cNvCxnSpPr/>
+          <p:nvPr/>
+        </p:nvCxnSpPr>
+        <p:spPr>
+          <a:xfrm>
+            <a:off x="3710411" y="0"/>
+            <a:ext cx="0" cy="4553893"/>
+          </a:xfrm>
+          <a:prstGeom prst="line">
+            <a:avLst/>
+          </a:prstGeom>
+        </p:spPr>
+        <p:style>
+          <a:lnRef idx="2">
+            <a:schemeClr val="accent1"/>
+          </a:lnRef>
+          <a:fillRef idx="0">
+            <a:schemeClr val="accent1"/>
+          </a:fillRef>
+          <a:effectRef idx="1">
+            <a:schemeClr val="accent1"/>
+          </a:effectRef>
+          <a:fontRef idx="minor">
+            <a:schemeClr val="tx1"/>
+          </a:fontRef>
+        </p:style>
+      </p:cxnSp>
+      <p:cxnSp>
+        <p:nvCxnSpPr>
+          <p:cNvPr id="14" name="Gerader Verbinder 13">
+            <a:extLst>
+              <a:ext uri="{FF2B5EF4-FFF2-40B4-BE49-F238E27FC236}">
+                <a16:creationId xmlns:a16="http://schemas.microsoft.com/office/drawing/2014/main" id="{7DC19335-6A79-E69D-5B44-D9B3A88B563B}"/>
+              </a:ext>
+            </a:extLst>
+          </p:cNvPr>
+          <p:cNvCxnSpPr/>
+          <p:nvPr/>
+        </p:nvCxnSpPr>
+        <p:spPr>
+          <a:xfrm>
+            <a:off x="5240448" y="0"/>
+            <a:ext cx="0" cy="4553893"/>
+          </a:xfrm>
+          <a:prstGeom prst="line">
+            <a:avLst/>
+          </a:prstGeom>
+        </p:spPr>
+        <p:style>
+          <a:lnRef idx="2">
+            <a:schemeClr val="accent1"/>
+          </a:lnRef>
+          <a:fillRef idx="0">
+            <a:schemeClr val="accent1"/>
+          </a:fillRef>
+          <a:effectRef idx="1">
+            <a:schemeClr val="accent1"/>
+          </a:effectRef>
+          <a:fontRef idx="minor">
+            <a:schemeClr val="tx1"/>
+          </a:fontRef>
+        </p:style>
+      </p:cxnSp>
+      <p:cxnSp>
+        <p:nvCxnSpPr>
+          <p:cNvPr id="15" name="Gerader Verbinder 14">
+            <a:extLst>
+              <a:ext uri="{FF2B5EF4-FFF2-40B4-BE49-F238E27FC236}">
+                <a16:creationId xmlns:a16="http://schemas.microsoft.com/office/drawing/2014/main" id="{A21C4D8B-1B5F-0938-465D-E8250358EB0A}"/>
+              </a:ext>
+            </a:extLst>
+          </p:cNvPr>
+          <p:cNvCxnSpPr/>
+          <p:nvPr/>
+        </p:nvCxnSpPr>
+        <p:spPr>
+          <a:xfrm>
+            <a:off x="6806697" y="0"/>
+            <a:ext cx="0" cy="4553893"/>
+          </a:xfrm>
+          <a:prstGeom prst="line">
+            <a:avLst/>
+          </a:prstGeom>
+        </p:spPr>
+        <p:style>
+          <a:lnRef idx="2">
+            <a:schemeClr val="accent1"/>
+          </a:lnRef>
+          <a:fillRef idx="0">
+            <a:schemeClr val="accent1"/>
+          </a:fillRef>
+          <a:effectRef idx="1">
+            <a:schemeClr val="accent1"/>
+          </a:effectRef>
+          <a:fontRef idx="minor">
+            <a:schemeClr val="tx1"/>
+          </a:fontRef>
+        </p:style>
+      </p:cxnSp>
+      <p:cxnSp>
+        <p:nvCxnSpPr>
+          <p:cNvPr id="16" name="Gerader Verbinder 15">
+            <a:extLst>
+              <a:ext uri="{FF2B5EF4-FFF2-40B4-BE49-F238E27FC236}">
+                <a16:creationId xmlns:a16="http://schemas.microsoft.com/office/drawing/2014/main" id="{ABE8D75A-7518-F9C2-47FC-DB3095529943}"/>
+              </a:ext>
+            </a:extLst>
+          </p:cNvPr>
+          <p:cNvCxnSpPr/>
+          <p:nvPr/>
+        </p:nvCxnSpPr>
+        <p:spPr>
+          <a:xfrm>
+            <a:off x="8463481" y="0"/>
+            <a:ext cx="0" cy="4553893"/>
+          </a:xfrm>
+          <a:prstGeom prst="line">
+            <a:avLst/>
+          </a:prstGeom>
+        </p:spPr>
+        <p:style>
+          <a:lnRef idx="2">
+            <a:schemeClr val="accent1"/>
+          </a:lnRef>
+          <a:fillRef idx="0">
+            <a:schemeClr val="accent1"/>
+          </a:fillRef>
+          <a:effectRef idx="1">
+            <a:schemeClr val="accent1"/>
+          </a:effectRef>
+          <a:fontRef idx="minor">
+            <a:schemeClr val="tx1"/>
+          </a:fontRef>
+        </p:style>
+      </p:cxnSp>
+      <p:cxnSp>
+        <p:nvCxnSpPr>
+          <p:cNvPr id="17" name="Gerader Verbinder 16">
+            <a:extLst>
+              <a:ext uri="{FF2B5EF4-FFF2-40B4-BE49-F238E27FC236}">
+                <a16:creationId xmlns:a16="http://schemas.microsoft.com/office/drawing/2014/main" id="{360B1BC2-6E63-16E6-C67A-9FB7F1C5FEC4}"/>
+              </a:ext>
+            </a:extLst>
+          </p:cNvPr>
+          <p:cNvCxnSpPr/>
+          <p:nvPr/>
+        </p:nvCxnSpPr>
+        <p:spPr>
+          <a:xfrm>
+            <a:off x="1483259" y="0"/>
+            <a:ext cx="0" cy="4553893"/>
+          </a:xfrm>
+          <a:prstGeom prst="line">
+            <a:avLst/>
+          </a:prstGeom>
+        </p:spPr>
+        <p:style>
+          <a:lnRef idx="2">
+            <a:schemeClr val="accent2"/>
+          </a:lnRef>
+          <a:fillRef idx="0">
+            <a:schemeClr val="accent2"/>
+          </a:fillRef>
+          <a:effectRef idx="1">
+            <a:schemeClr val="accent2"/>
+          </a:effectRef>
+          <a:fontRef idx="minor">
+            <a:schemeClr val="tx1"/>
+          </a:fontRef>
+        </p:style>
+      </p:cxnSp>
+      <p:cxnSp>
+        <p:nvCxnSpPr>
+          <p:cNvPr id="18" name="Gerader Verbinder 17">
+            <a:extLst>
+              <a:ext uri="{FF2B5EF4-FFF2-40B4-BE49-F238E27FC236}">
+                <a16:creationId xmlns:a16="http://schemas.microsoft.com/office/drawing/2014/main" id="{86AE0B99-4C03-082B-FE17-838DE2EDC5AB}"/>
+              </a:ext>
+            </a:extLst>
+          </p:cNvPr>
+          <p:cNvCxnSpPr/>
+          <p:nvPr/>
+        </p:nvCxnSpPr>
+        <p:spPr>
+          <a:xfrm>
+            <a:off x="2922760" y="0"/>
+            <a:ext cx="0" cy="4553893"/>
+          </a:xfrm>
+          <a:prstGeom prst="line">
+            <a:avLst/>
+          </a:prstGeom>
+        </p:spPr>
+        <p:style>
+          <a:lnRef idx="2">
+            <a:schemeClr val="accent2"/>
+          </a:lnRef>
+          <a:fillRef idx="0">
+            <a:schemeClr val="accent2"/>
+          </a:fillRef>
+          <a:effectRef idx="1">
+            <a:schemeClr val="accent2"/>
+          </a:effectRef>
+          <a:fontRef idx="minor">
+            <a:schemeClr val="tx1"/>
+          </a:fontRef>
+        </p:style>
+      </p:cxnSp>
+      <p:cxnSp>
+        <p:nvCxnSpPr>
+          <p:cNvPr id="19" name="Gerader Verbinder 18">
+            <a:extLst>
+              <a:ext uri="{FF2B5EF4-FFF2-40B4-BE49-F238E27FC236}">
+                <a16:creationId xmlns:a16="http://schemas.microsoft.com/office/drawing/2014/main" id="{36012DA8-BCC7-A8BE-30FB-A3273C2FF000}"/>
+              </a:ext>
+            </a:extLst>
+          </p:cNvPr>
+          <p:cNvCxnSpPr/>
+          <p:nvPr/>
+        </p:nvCxnSpPr>
+        <p:spPr>
+          <a:xfrm>
+            <a:off x="4479956" y="0"/>
+            <a:ext cx="0" cy="4553893"/>
+          </a:xfrm>
+          <a:prstGeom prst="line">
+            <a:avLst/>
+          </a:prstGeom>
+        </p:spPr>
+        <p:style>
+          <a:lnRef idx="2">
+            <a:schemeClr val="accent2"/>
+          </a:lnRef>
+          <a:fillRef idx="0">
+            <a:schemeClr val="accent2"/>
+          </a:fillRef>
+          <a:effectRef idx="1">
+            <a:schemeClr val="accent2"/>
+          </a:effectRef>
+          <a:fontRef idx="minor">
+            <a:schemeClr val="tx1"/>
+          </a:fontRef>
+        </p:style>
+      </p:cxnSp>
+      <p:cxnSp>
+        <p:nvCxnSpPr>
+          <p:cNvPr id="20" name="Gerader Verbinder 19">
+            <a:extLst>
+              <a:ext uri="{FF2B5EF4-FFF2-40B4-BE49-F238E27FC236}">
+                <a16:creationId xmlns:a16="http://schemas.microsoft.com/office/drawing/2014/main" id="{A63A12BE-AF8D-FDCC-8812-FE4AA8977BFF}"/>
+              </a:ext>
+            </a:extLst>
+          </p:cNvPr>
+          <p:cNvCxnSpPr/>
+          <p:nvPr/>
+        </p:nvCxnSpPr>
+        <p:spPr>
+          <a:xfrm>
+            <a:off x="6028099" y="0"/>
+            <a:ext cx="0" cy="4553893"/>
+          </a:xfrm>
+          <a:prstGeom prst="line">
+            <a:avLst/>
+          </a:prstGeom>
+        </p:spPr>
+        <p:style>
+          <a:lnRef idx="2">
+            <a:schemeClr val="accent2"/>
+          </a:lnRef>
+          <a:fillRef idx="0">
+            <a:schemeClr val="accent2"/>
+          </a:fillRef>
+          <a:effectRef idx="1">
+            <a:schemeClr val="accent2"/>
+          </a:effectRef>
+          <a:fontRef idx="minor">
+            <a:schemeClr val="tx1"/>
+          </a:fontRef>
+        </p:style>
+      </p:cxnSp>
+      <p:pic>
+        <p:nvPicPr>
+          <p:cNvPr id="21" name="Grafik 20" descr="Ein Bild, das Kreis, Farbigkeit, Geschirr enthält.&#10;&#10;Automatisch generierte Beschreibung">
+            <a:extLst>
+              <a:ext uri="{FF2B5EF4-FFF2-40B4-BE49-F238E27FC236}">
+                <a16:creationId xmlns:a16="http://schemas.microsoft.com/office/drawing/2014/main" id="{E14AC0B9-4717-D452-5D15-0CFED26DF0E6}"/>
+              </a:ext>
+            </a:extLst>
+          </p:cNvPr>
+          <p:cNvPicPr>
+            <a:picLocks noChangeAspect="1"/>
+          </p:cNvPicPr>
+          <p:nvPr/>
+        </p:nvPicPr>
+        <p:blipFill>
+          <a:blip r:embed="rId2">
+            <a:extLst>
+              <a:ext uri="{28A0092B-C50C-407E-A947-70E740481C1C}">
+                <a14:useLocalDpi xmlns:a14="http://schemas.microsoft.com/office/drawing/2010/main" val="0"/>
+              </a:ext>
+            </a:extLst>
+          </a:blip>
+          <a:stretch>
+            <a:fillRect/>
+          </a:stretch>
+        </p:blipFill>
+        <p:spPr>
+          <a:xfrm flipH="1">
+            <a:off x="4104237" y="129013"/>
+            <a:ext cx="751437" cy="751437"/>
+          </a:xfrm>
+          <a:prstGeom prst="rect">
+            <a:avLst/>
+          </a:prstGeom>
+        </p:spPr>
+      </p:pic>
+      <p:pic>
+        <p:nvPicPr>
+          <p:cNvPr id="22" name="Grafik 21" descr="Ein Bild, das Kreis, Farbigkeit, Geschirr enthält.&#10;&#10;Automatisch generierte Beschreibung">
+            <a:extLst>
+              <a:ext uri="{FF2B5EF4-FFF2-40B4-BE49-F238E27FC236}">
+                <a16:creationId xmlns:a16="http://schemas.microsoft.com/office/drawing/2014/main" id="{19D33C12-57F5-33CC-0615-0B470E294074}"/>
+              </a:ext>
+            </a:extLst>
+          </p:cNvPr>
+          <p:cNvPicPr>
+            <a:picLocks noChangeAspect="1"/>
+          </p:cNvPicPr>
+          <p:nvPr/>
+        </p:nvPicPr>
+        <p:blipFill>
+          <a:blip r:embed="rId2">
+            <a:extLst>
+              <a:ext uri="{28A0092B-C50C-407E-A947-70E740481C1C}">
+                <a14:useLocalDpi xmlns:a14="http://schemas.microsoft.com/office/drawing/2010/main" val="0"/>
+              </a:ext>
+            </a:extLst>
+          </a:blip>
+          <a:stretch>
+            <a:fillRect/>
+          </a:stretch>
+        </p:blipFill>
+        <p:spPr>
+          <a:xfrm flipH="1">
+            <a:off x="1107540" y="64129"/>
+            <a:ext cx="751437" cy="751437"/>
+          </a:xfrm>
+          <a:prstGeom prst="rect">
+            <a:avLst/>
+          </a:prstGeom>
+        </p:spPr>
+      </p:pic>
+      <p:pic>
+        <p:nvPicPr>
+          <p:cNvPr id="23" name="Grafik 22" descr="Ein Bild, das Kreis, Farbigkeit, Geschirr enthält.&#10;&#10;Automatisch generierte Beschreibung">
+            <a:extLst>
+              <a:ext uri="{FF2B5EF4-FFF2-40B4-BE49-F238E27FC236}">
+                <a16:creationId xmlns:a16="http://schemas.microsoft.com/office/drawing/2014/main" id="{B826F6C2-0FA9-A706-3227-CD6513FA07B8}"/>
+              </a:ext>
+            </a:extLst>
+          </p:cNvPr>
+          <p:cNvPicPr>
+            <a:picLocks noChangeAspect="1"/>
+          </p:cNvPicPr>
+          <p:nvPr/>
+        </p:nvPicPr>
+        <p:blipFill>
+          <a:blip r:embed="rId2">
+            <a:extLst>
+              <a:ext uri="{28A0092B-C50C-407E-A947-70E740481C1C}">
+                <a14:useLocalDpi xmlns:a14="http://schemas.microsoft.com/office/drawing/2010/main" val="0"/>
+              </a:ext>
+            </a:extLst>
+          </a:blip>
+          <a:stretch>
+            <a:fillRect/>
+          </a:stretch>
+        </p:blipFill>
+        <p:spPr>
+          <a:xfrm flipH="1">
+            <a:off x="1849925" y="932508"/>
+            <a:ext cx="751437" cy="751437"/>
+          </a:xfrm>
+          <a:prstGeom prst="rect">
+            <a:avLst/>
+          </a:prstGeom>
+        </p:spPr>
+      </p:pic>
+      <p:pic>
+        <p:nvPicPr>
+          <p:cNvPr id="24" name="Grafik 23" descr="Ein Bild, das Kreis, Farbigkeit, Geschirr enthält.&#10;&#10;Automatisch generierte Beschreibung">
+            <a:extLst>
+              <a:ext uri="{FF2B5EF4-FFF2-40B4-BE49-F238E27FC236}">
+                <a16:creationId xmlns:a16="http://schemas.microsoft.com/office/drawing/2014/main" id="{75C59F93-B7CA-902B-0227-0390FA19B75A}"/>
+              </a:ext>
+            </a:extLst>
+          </p:cNvPr>
+          <p:cNvPicPr>
+            <a:picLocks noChangeAspect="1"/>
+          </p:cNvPicPr>
+          <p:nvPr/>
+        </p:nvPicPr>
+        <p:blipFill>
+          <a:blip r:embed="rId2">
+            <a:extLst>
+              <a:ext uri="{28A0092B-C50C-407E-A947-70E740481C1C}">
+                <a14:useLocalDpi xmlns:a14="http://schemas.microsoft.com/office/drawing/2010/main" val="0"/>
+              </a:ext>
+            </a:extLst>
+          </a:blip>
+          <a:stretch>
+            <a:fillRect/>
+          </a:stretch>
+        </p:blipFill>
+        <p:spPr>
+          <a:xfrm flipH="1">
+            <a:off x="1066800" y="1788059"/>
+            <a:ext cx="751437" cy="751437"/>
+          </a:xfrm>
+          <a:prstGeom prst="rect">
+            <a:avLst/>
+          </a:prstGeom>
+        </p:spPr>
+      </p:pic>
+      <p:pic>
+        <p:nvPicPr>
+          <p:cNvPr id="25" name="Grafik 24" descr="Ein Bild, das Kreis, Farbigkeit, Geschirr enthält.&#10;&#10;Automatisch generierte Beschreibung">
+            <a:extLst>
+              <a:ext uri="{FF2B5EF4-FFF2-40B4-BE49-F238E27FC236}">
+                <a16:creationId xmlns:a16="http://schemas.microsoft.com/office/drawing/2014/main" id="{0479A93F-D4A6-DFE1-6AF5-B48FBEF82DE0}"/>
+              </a:ext>
+            </a:extLst>
+          </p:cNvPr>
+          <p:cNvPicPr>
+            <a:picLocks noChangeAspect="1"/>
+          </p:cNvPicPr>
+          <p:nvPr/>
+        </p:nvPicPr>
+        <p:blipFill>
+          <a:blip r:embed="rId2">
+            <a:extLst>
+              <a:ext uri="{28A0092B-C50C-407E-A947-70E740481C1C}">
+                <a14:useLocalDpi xmlns:a14="http://schemas.microsoft.com/office/drawing/2010/main" val="0"/>
+              </a:ext>
+            </a:extLst>
+          </a:blip>
+          <a:stretch>
+            <a:fillRect/>
+          </a:stretch>
+        </p:blipFill>
+        <p:spPr>
+          <a:xfrm flipH="1">
+            <a:off x="2519881" y="1788059"/>
+            <a:ext cx="751437" cy="751437"/>
+          </a:xfrm>
+          <a:prstGeom prst="rect">
+            <a:avLst/>
+          </a:prstGeom>
+        </p:spPr>
+      </p:pic>
+      <p:pic>
+        <p:nvPicPr>
+          <p:cNvPr id="26" name="Grafik 25" descr="Ein Bild, das Kreis, Farbigkeit, Geschirr enthält.&#10;&#10;Automatisch generierte Beschreibung">
+            <a:extLst>
+              <a:ext uri="{FF2B5EF4-FFF2-40B4-BE49-F238E27FC236}">
+                <a16:creationId xmlns:a16="http://schemas.microsoft.com/office/drawing/2014/main" id="{5B17D540-8751-C52C-9517-F69965548752}"/>
+              </a:ext>
+            </a:extLst>
+          </p:cNvPr>
+          <p:cNvPicPr>
+            <a:picLocks noChangeAspect="1"/>
+          </p:cNvPicPr>
+          <p:nvPr/>
+        </p:nvPicPr>
+        <p:blipFill>
+          <a:blip r:embed="rId2">
+            <a:extLst>
+              <a:ext uri="{28A0092B-C50C-407E-A947-70E740481C1C}">
+                <a14:useLocalDpi xmlns:a14="http://schemas.microsoft.com/office/drawing/2010/main" val="0"/>
+              </a:ext>
+            </a:extLst>
+          </a:blip>
+          <a:stretch>
+            <a:fillRect/>
+          </a:stretch>
+        </p:blipFill>
+        <p:spPr>
+          <a:xfrm flipH="1">
+            <a:off x="2592309" y="76956"/>
+            <a:ext cx="751437" cy="751437"/>
+          </a:xfrm>
+          <a:prstGeom prst="rect">
+            <a:avLst/>
+          </a:prstGeom>
+        </p:spPr>
+      </p:pic>
+      <p:pic>
+        <p:nvPicPr>
+          <p:cNvPr id="27" name="Grafik 26" descr="Ein Bild, das Kreis, Farbigkeit, Geschirr enthält.&#10;&#10;Automatisch generierte Beschreibung">
+            <a:extLst>
+              <a:ext uri="{FF2B5EF4-FFF2-40B4-BE49-F238E27FC236}">
+                <a16:creationId xmlns:a16="http://schemas.microsoft.com/office/drawing/2014/main" id="{85AE4673-DEAE-3538-C0B5-07CCC84B98C2}"/>
+              </a:ext>
+            </a:extLst>
+          </p:cNvPr>
+          <p:cNvPicPr>
+            <a:picLocks noChangeAspect="1"/>
+          </p:cNvPicPr>
+          <p:nvPr/>
+        </p:nvPicPr>
+        <p:blipFill>
+          <a:blip r:embed="rId2">
+            <a:extLst>
+              <a:ext uri="{28A0092B-C50C-407E-A947-70E740481C1C}">
+                <a14:useLocalDpi xmlns:a14="http://schemas.microsoft.com/office/drawing/2010/main" val="0"/>
+              </a:ext>
+            </a:extLst>
+          </a:blip>
+          <a:stretch>
+            <a:fillRect/>
+          </a:stretch>
+        </p:blipFill>
+        <p:spPr>
+          <a:xfrm flipH="1">
+            <a:off x="3343746" y="932508"/>
+            <a:ext cx="751437" cy="751437"/>
+          </a:xfrm>
+          <a:prstGeom prst="rect">
+            <a:avLst/>
+          </a:prstGeom>
+        </p:spPr>
+      </p:pic>
+      <p:pic>
+        <p:nvPicPr>
+          <p:cNvPr id="28" name="Grafik 27" descr="Ein Bild, das Kreis, Farbigkeit, Geschirr enthält.&#10;&#10;Automatisch generierte Beschreibung">
+            <a:extLst>
+              <a:ext uri="{FF2B5EF4-FFF2-40B4-BE49-F238E27FC236}">
+                <a16:creationId xmlns:a16="http://schemas.microsoft.com/office/drawing/2014/main" id="{519695B3-1AC8-81DA-A9F3-D7E0C6FCAF66}"/>
+              </a:ext>
+            </a:extLst>
+          </p:cNvPr>
+          <p:cNvPicPr>
+            <a:picLocks noChangeAspect="1"/>
+          </p:cNvPicPr>
+          <p:nvPr/>
+        </p:nvPicPr>
+        <p:blipFill>
+          <a:blip r:embed="rId2">
+            <a:extLst>
+              <a:ext uri="{28A0092B-C50C-407E-A947-70E740481C1C}">
+                <a14:useLocalDpi xmlns:a14="http://schemas.microsoft.com/office/drawing/2010/main" val="0"/>
+              </a:ext>
+            </a:extLst>
+          </a:blip>
+          <a:stretch>
+            <a:fillRect/>
+          </a:stretch>
+        </p:blipFill>
+        <p:spPr>
+          <a:xfrm flipH="1">
+            <a:off x="4030299" y="1800887"/>
+            <a:ext cx="751437" cy="751437"/>
+          </a:xfrm>
+          <a:prstGeom prst="rect">
+            <a:avLst/>
+          </a:prstGeom>
+        </p:spPr>
+      </p:pic>
+      <p:sp>
+        <p:nvSpPr>
+          <p:cNvPr id="29" name="Textfeld 28">
+            <a:extLst>
+              <a:ext uri="{FF2B5EF4-FFF2-40B4-BE49-F238E27FC236}">
+                <a16:creationId xmlns:a16="http://schemas.microsoft.com/office/drawing/2014/main" id="{672A9ECC-EF92-252A-0F64-B3390B66734F}"/>
+              </a:ext>
+            </a:extLst>
+          </p:cNvPr>
+          <p:cNvSpPr txBox="1"/>
+          <p:nvPr/>
+        </p:nvSpPr>
+        <p:spPr>
+          <a:xfrm>
+            <a:off x="-9055" y="243866"/>
+            <a:ext cx="1351984" cy="369332"/>
+          </a:xfrm>
+          <a:prstGeom prst="rect">
+            <a:avLst/>
+          </a:prstGeom>
+          <a:noFill/>
+        </p:spPr>
+        <p:txBody>
+          <a:bodyPr wrap="square" rtlCol="0">
+            <a:spAutoFit/>
+          </a:bodyPr>
+          <a:lstStyle/>
+          <a:p>
+            <a:r>
+              <a:rPr lang="de-DE" dirty="0"/>
+              <a:t>Reihe 0</a:t>
+            </a:r>
+          </a:p>
+        </p:txBody>
+      </p:sp>
+      <p:sp>
+        <p:nvSpPr>
+          <p:cNvPr id="31" name="Textfeld 30">
+            <a:extLst>
+              <a:ext uri="{FF2B5EF4-FFF2-40B4-BE49-F238E27FC236}">
+                <a16:creationId xmlns:a16="http://schemas.microsoft.com/office/drawing/2014/main" id="{C7CD3D7D-D0A0-2BAA-CA2D-C40887E70F40}"/>
+              </a:ext>
+            </a:extLst>
+          </p:cNvPr>
+          <p:cNvSpPr txBox="1"/>
+          <p:nvPr/>
+        </p:nvSpPr>
+        <p:spPr>
+          <a:xfrm>
+            <a:off x="923455" y="3890150"/>
+            <a:ext cx="1351984" cy="369332"/>
+          </a:xfrm>
+          <a:prstGeom prst="rect">
+            <a:avLst/>
+          </a:prstGeom>
+          <a:noFill/>
+        </p:spPr>
+        <p:txBody>
+          <a:bodyPr wrap="square" rtlCol="0">
+            <a:spAutoFit/>
+          </a:bodyPr>
+          <a:lstStyle/>
+          <a:p>
+            <a:r>
+              <a:rPr lang="de-DE" dirty="0"/>
+              <a:t>Spalte 0</a:t>
+            </a:r>
+          </a:p>
+        </p:txBody>
+      </p:sp>
+      <p:sp>
+        <p:nvSpPr>
+          <p:cNvPr id="33" name="Textfeld 32">
+            <a:extLst>
+              <a:ext uri="{FF2B5EF4-FFF2-40B4-BE49-F238E27FC236}">
+                <a16:creationId xmlns:a16="http://schemas.microsoft.com/office/drawing/2014/main" id="{B35E25CE-313E-7A51-A776-3FA60DA5584D}"/>
+              </a:ext>
+            </a:extLst>
+          </p:cNvPr>
+          <p:cNvSpPr txBox="1"/>
+          <p:nvPr/>
+        </p:nvSpPr>
+        <p:spPr>
+          <a:xfrm>
+            <a:off x="1637168" y="4320538"/>
+            <a:ext cx="1351984" cy="369332"/>
+          </a:xfrm>
+          <a:prstGeom prst="rect">
+            <a:avLst/>
+          </a:prstGeom>
+          <a:noFill/>
+        </p:spPr>
+        <p:txBody>
+          <a:bodyPr wrap="square" rtlCol="0">
+            <a:spAutoFit/>
+          </a:bodyPr>
+          <a:lstStyle/>
+          <a:p>
+            <a:r>
+              <a:rPr lang="de-DE" dirty="0"/>
+              <a:t>Spalte 1</a:t>
+            </a:r>
+          </a:p>
+        </p:txBody>
+      </p:sp>
+      <p:sp>
+        <p:nvSpPr>
+          <p:cNvPr id="34" name="Textfeld 33">
+            <a:extLst>
+              <a:ext uri="{FF2B5EF4-FFF2-40B4-BE49-F238E27FC236}">
+                <a16:creationId xmlns:a16="http://schemas.microsoft.com/office/drawing/2014/main" id="{FE5174C9-0EE9-6808-C119-6B56153B4427}"/>
+              </a:ext>
+            </a:extLst>
+          </p:cNvPr>
+          <p:cNvSpPr txBox="1"/>
+          <p:nvPr/>
+        </p:nvSpPr>
+        <p:spPr>
+          <a:xfrm>
+            <a:off x="2447454" y="3890150"/>
+            <a:ext cx="1351984" cy="369332"/>
+          </a:xfrm>
+          <a:prstGeom prst="rect">
+            <a:avLst/>
+          </a:prstGeom>
+          <a:noFill/>
+        </p:spPr>
+        <p:txBody>
+          <a:bodyPr wrap="square" rtlCol="0">
+            <a:spAutoFit/>
+          </a:bodyPr>
+          <a:lstStyle/>
+          <a:p>
+            <a:r>
+              <a:rPr lang="de-DE" dirty="0"/>
+              <a:t>Spalte 2</a:t>
+            </a:r>
+          </a:p>
+        </p:txBody>
+      </p:sp>
+      <p:sp>
+        <p:nvSpPr>
+          <p:cNvPr id="35" name="Textfeld 34">
+            <a:extLst>
+              <a:ext uri="{FF2B5EF4-FFF2-40B4-BE49-F238E27FC236}">
+                <a16:creationId xmlns:a16="http://schemas.microsoft.com/office/drawing/2014/main" id="{C5F0DE67-835D-B479-87A9-0A51868BCBD7}"/>
+              </a:ext>
+            </a:extLst>
+          </p:cNvPr>
+          <p:cNvSpPr txBox="1"/>
+          <p:nvPr/>
+        </p:nvSpPr>
+        <p:spPr>
+          <a:xfrm>
+            <a:off x="152400" y="1101188"/>
+            <a:ext cx="1351984" cy="369332"/>
+          </a:xfrm>
+          <a:prstGeom prst="rect">
+            <a:avLst/>
+          </a:prstGeom>
+          <a:noFill/>
+        </p:spPr>
+        <p:txBody>
+          <a:bodyPr wrap="square" rtlCol="0">
+            <a:spAutoFit/>
+          </a:bodyPr>
+          <a:lstStyle/>
+          <a:p>
+            <a:r>
+              <a:rPr lang="de-DE" dirty="0"/>
+              <a:t>Reihe 1</a:t>
+            </a:r>
+          </a:p>
+        </p:txBody>
+      </p:sp>
+      <p:sp>
+        <p:nvSpPr>
+          <p:cNvPr id="36" name="Textfeld 35">
+            <a:extLst>
+              <a:ext uri="{FF2B5EF4-FFF2-40B4-BE49-F238E27FC236}">
+                <a16:creationId xmlns:a16="http://schemas.microsoft.com/office/drawing/2014/main" id="{BC32CF1A-9C1B-6AB1-6FC1-6DD13B8BBE51}"/>
+              </a:ext>
+            </a:extLst>
+          </p:cNvPr>
+          <p:cNvSpPr txBox="1"/>
+          <p:nvPr/>
+        </p:nvSpPr>
+        <p:spPr>
+          <a:xfrm>
+            <a:off x="3223788" y="4320538"/>
+            <a:ext cx="1351984" cy="369332"/>
+          </a:xfrm>
+          <a:prstGeom prst="rect">
+            <a:avLst/>
+          </a:prstGeom>
+          <a:noFill/>
+        </p:spPr>
+        <p:txBody>
+          <a:bodyPr wrap="square" rtlCol="0">
+            <a:spAutoFit/>
+          </a:bodyPr>
+          <a:lstStyle/>
+          <a:p>
+            <a:r>
+              <a:rPr lang="de-DE" dirty="0"/>
+              <a:t>Spalte 3</a:t>
+            </a:r>
+          </a:p>
+        </p:txBody>
+      </p:sp>
+      <p:sp>
+        <p:nvSpPr>
+          <p:cNvPr id="37" name="Textfeld 36">
+            <a:extLst>
+              <a:ext uri="{FF2B5EF4-FFF2-40B4-BE49-F238E27FC236}">
+                <a16:creationId xmlns:a16="http://schemas.microsoft.com/office/drawing/2014/main" id="{2C98581A-4309-39D0-C46B-8E27032E9452}"/>
+              </a:ext>
+            </a:extLst>
+          </p:cNvPr>
+          <p:cNvSpPr txBox="1"/>
+          <p:nvPr/>
+        </p:nvSpPr>
+        <p:spPr>
+          <a:xfrm>
+            <a:off x="7111497" y="3767435"/>
+            <a:ext cx="1351984" cy="369332"/>
+          </a:xfrm>
+          <a:prstGeom prst="rect">
+            <a:avLst/>
+          </a:prstGeom>
+          <a:noFill/>
+        </p:spPr>
+        <p:txBody>
+          <a:bodyPr wrap="square" rtlCol="0">
+            <a:spAutoFit/>
+          </a:bodyPr>
+          <a:lstStyle/>
+          <a:p>
+            <a:r>
+              <a:rPr lang="de-DE" dirty="0"/>
+              <a:t>Spalte 30</a:t>
+            </a:r>
+          </a:p>
+        </p:txBody>
+      </p:sp>
+      <p:sp>
+        <p:nvSpPr>
+          <p:cNvPr id="38" name="Textfeld 37">
+            <a:extLst>
+              <a:ext uri="{FF2B5EF4-FFF2-40B4-BE49-F238E27FC236}">
+                <a16:creationId xmlns:a16="http://schemas.microsoft.com/office/drawing/2014/main" id="{C65A405B-53D4-7B88-B19A-D4EEBE56101B}"/>
+              </a:ext>
+            </a:extLst>
+          </p:cNvPr>
+          <p:cNvSpPr txBox="1"/>
+          <p:nvPr/>
+        </p:nvSpPr>
+        <p:spPr>
+          <a:xfrm>
+            <a:off x="6283106" y="4259482"/>
+            <a:ext cx="1351984" cy="369332"/>
+          </a:xfrm>
+          <a:prstGeom prst="rect">
+            <a:avLst/>
+          </a:prstGeom>
+          <a:noFill/>
+        </p:spPr>
+        <p:txBody>
+          <a:bodyPr wrap="square" rtlCol="0">
+            <a:spAutoFit/>
+          </a:bodyPr>
+          <a:lstStyle/>
+          <a:p>
+            <a:r>
+              <a:rPr lang="de-DE" dirty="0"/>
+              <a:t>Spalte 29</a:t>
+            </a:r>
+          </a:p>
+        </p:txBody>
+      </p:sp>
+      <p:cxnSp>
+        <p:nvCxnSpPr>
+          <p:cNvPr id="39" name="Gerader Verbinder 38">
+            <a:extLst>
+              <a:ext uri="{FF2B5EF4-FFF2-40B4-BE49-F238E27FC236}">
+                <a16:creationId xmlns:a16="http://schemas.microsoft.com/office/drawing/2014/main" id="{27428EFA-097A-B2EA-CA75-3CD16D5A0EAD}"/>
+              </a:ext>
+            </a:extLst>
+          </p:cNvPr>
+          <p:cNvCxnSpPr/>
+          <p:nvPr/>
+        </p:nvCxnSpPr>
+        <p:spPr>
+          <a:xfrm>
+            <a:off x="7601893" y="-5772"/>
+            <a:ext cx="0" cy="4553893"/>
+          </a:xfrm>
+          <a:prstGeom prst="line">
+            <a:avLst/>
+          </a:prstGeom>
+        </p:spPr>
+        <p:style>
+          <a:lnRef idx="2">
+            <a:schemeClr val="accent2"/>
+          </a:lnRef>
+          <a:fillRef idx="0">
+            <a:schemeClr val="accent2"/>
+          </a:fillRef>
+          <a:effectRef idx="1">
+            <a:schemeClr val="accent2"/>
+          </a:effectRef>
+          <a:fontRef idx="minor">
+            <a:schemeClr val="tx1"/>
+          </a:fontRef>
+        </p:style>
+      </p:cxnSp>
+    </p:spTree>
+    <p:extLst>
+      <p:ext uri="{BB962C8B-B14F-4D97-AF65-F5344CB8AC3E}">
+        <p14:creationId xmlns:p14="http://schemas.microsoft.com/office/powerpoint/2010/main" val="348690806"/>
       </p:ext>
     </p:extLst>
   </p:cSld>

</xml_diff>